<commit_message>
songs for 11th August
</commit_message>
<xml_diff>
--- a/docs/songs/holy spirit.pptx
+++ b/docs/songs/holy spirit.pptx
@@ -310,7 +310,7 @@
             <a:fld id="{26EA1CF3-4A15-4CBF-9A5A-6A56C368BE71}" type="datetimeFigureOut">
               <a:rPr lang="en-GB" smtClean="0"/>
               <a:pPr/>
-              <a:t>18/04/2023</a:t>
+              <a:t>05/08/2024</a:t>
             </a:fld>
             <a:endParaRPr lang="en-GB"/>
           </a:p>
@@ -477,7 +477,7 @@
             <a:fld id="{26EA1CF3-4A15-4CBF-9A5A-6A56C368BE71}" type="datetimeFigureOut">
               <a:rPr lang="en-GB" smtClean="0"/>
               <a:pPr/>
-              <a:t>18/04/2023</a:t>
+              <a:t>05/08/2024</a:t>
             </a:fld>
             <a:endParaRPr lang="en-GB"/>
           </a:p>
@@ -654,7 +654,7 @@
             <a:fld id="{26EA1CF3-4A15-4CBF-9A5A-6A56C368BE71}" type="datetimeFigureOut">
               <a:rPr lang="en-GB" smtClean="0"/>
               <a:pPr/>
-              <a:t>18/04/2023</a:t>
+              <a:t>05/08/2024</a:t>
             </a:fld>
             <a:endParaRPr lang="en-GB"/>
           </a:p>
@@ -821,7 +821,7 @@
             <a:fld id="{26EA1CF3-4A15-4CBF-9A5A-6A56C368BE71}" type="datetimeFigureOut">
               <a:rPr lang="en-GB" smtClean="0"/>
               <a:pPr/>
-              <a:t>18/04/2023</a:t>
+              <a:t>05/08/2024</a:t>
             </a:fld>
             <a:endParaRPr lang="en-GB"/>
           </a:p>
@@ -1064,7 +1064,7 @@
             <a:fld id="{26EA1CF3-4A15-4CBF-9A5A-6A56C368BE71}" type="datetimeFigureOut">
               <a:rPr lang="en-GB" smtClean="0"/>
               <a:pPr/>
-              <a:t>18/04/2023</a:t>
+              <a:t>05/08/2024</a:t>
             </a:fld>
             <a:endParaRPr lang="en-GB"/>
           </a:p>
@@ -1349,7 +1349,7 @@
             <a:fld id="{26EA1CF3-4A15-4CBF-9A5A-6A56C368BE71}" type="datetimeFigureOut">
               <a:rPr lang="en-GB" smtClean="0"/>
               <a:pPr/>
-              <a:t>18/04/2023</a:t>
+              <a:t>05/08/2024</a:t>
             </a:fld>
             <a:endParaRPr lang="en-GB"/>
           </a:p>
@@ -1768,7 +1768,7 @@
             <a:fld id="{26EA1CF3-4A15-4CBF-9A5A-6A56C368BE71}" type="datetimeFigureOut">
               <a:rPr lang="en-GB" smtClean="0"/>
               <a:pPr/>
-              <a:t>18/04/2023</a:t>
+              <a:t>05/08/2024</a:t>
             </a:fld>
             <a:endParaRPr lang="en-GB"/>
           </a:p>
@@ -1883,7 +1883,7 @@
             <a:fld id="{26EA1CF3-4A15-4CBF-9A5A-6A56C368BE71}" type="datetimeFigureOut">
               <a:rPr lang="en-GB" smtClean="0"/>
               <a:pPr/>
-              <a:t>18/04/2023</a:t>
+              <a:t>05/08/2024</a:t>
             </a:fld>
             <a:endParaRPr lang="en-GB"/>
           </a:p>
@@ -1975,7 +1975,7 @@
             <a:fld id="{26EA1CF3-4A15-4CBF-9A5A-6A56C368BE71}" type="datetimeFigureOut">
               <a:rPr lang="en-GB" smtClean="0"/>
               <a:pPr/>
-              <a:t>18/04/2023</a:t>
+              <a:t>05/08/2024</a:t>
             </a:fld>
             <a:endParaRPr lang="en-GB"/>
           </a:p>
@@ -2249,7 +2249,7 @@
             <a:fld id="{26EA1CF3-4A15-4CBF-9A5A-6A56C368BE71}" type="datetimeFigureOut">
               <a:rPr lang="en-GB" smtClean="0"/>
               <a:pPr/>
-              <a:t>18/04/2023</a:t>
+              <a:t>05/08/2024</a:t>
             </a:fld>
             <a:endParaRPr lang="en-GB"/>
           </a:p>
@@ -2499,7 +2499,7 @@
             <a:fld id="{26EA1CF3-4A15-4CBF-9A5A-6A56C368BE71}" type="datetimeFigureOut">
               <a:rPr lang="en-GB" smtClean="0"/>
               <a:pPr/>
-              <a:t>18/04/2023</a:t>
+              <a:t>05/08/2024</a:t>
             </a:fld>
             <a:endParaRPr lang="en-GB"/>
           </a:p>
@@ -2712,7 +2712,7 @@
             <a:fld id="{26EA1CF3-4A15-4CBF-9A5A-6A56C368BE71}" type="datetimeFigureOut">
               <a:rPr lang="en-GB" smtClean="0"/>
               <a:pPr/>
-              <a:t>18/04/2023</a:t>
+              <a:t>05/08/2024</a:t>
             </a:fld>
             <a:endParaRPr lang="en-GB"/>
           </a:p>
@@ -3307,7 +3307,7 @@
         </p:nvSpPr>
         <p:spPr>
           <a:xfrm>
-            <a:off x="323528" y="188640"/>
+            <a:off x="251520" y="764704"/>
             <a:ext cx="8640960" cy="6480720"/>
           </a:xfrm>
         </p:spPr>
@@ -3318,7 +3318,7 @@
           <a:lstStyle/>
           <a:p>
             <a:r>
-              <a:rPr lang="en-GB" sz="4000" dirty="0">
+              <a:rPr lang="en-GB" sz="3600" dirty="0">
                 <a:solidFill>
                   <a:schemeClr val="bg1"/>
                 </a:solidFill>
@@ -3328,7 +3328,7 @@
           </a:p>
           <a:p>
             <a:r>
-              <a:rPr lang="en-GB" sz="4000" dirty="0">
+              <a:rPr lang="en-GB" sz="3600" dirty="0">
                 <a:solidFill>
                   <a:schemeClr val="bg1"/>
                 </a:solidFill>
@@ -3338,7 +3338,7 @@
           </a:p>
           <a:p>
             <a:r>
-              <a:rPr lang="en-GB" sz="4000" dirty="0">
+              <a:rPr lang="en-GB" sz="3600" dirty="0">
                 <a:solidFill>
                   <a:schemeClr val="bg1"/>
                 </a:solidFill>
@@ -3423,7 +3423,7 @@
         </p:nvSpPr>
         <p:spPr>
           <a:xfrm>
-            <a:off x="323528" y="188640"/>
+            <a:off x="203118" y="692696"/>
             <a:ext cx="8640960" cy="6480720"/>
           </a:xfrm>
         </p:spPr>
@@ -3434,7 +3434,7 @@
           <a:lstStyle/>
           <a:p>
             <a:r>
-              <a:rPr lang="en-GB" sz="4000" dirty="0">
+              <a:rPr lang="en-GB" sz="3600" dirty="0">
                 <a:solidFill>
                   <a:schemeClr val="bg1"/>
                 </a:solidFill>
@@ -3444,7 +3444,7 @@
           </a:p>
           <a:p>
             <a:r>
-              <a:rPr lang="en-GB" sz="4000" dirty="0">
+              <a:rPr lang="en-GB" sz="3600" dirty="0">
                 <a:solidFill>
                   <a:schemeClr val="bg1"/>
                 </a:solidFill>
@@ -3454,7 +3454,7 @@
           </a:p>
           <a:p>
             <a:r>
-              <a:rPr lang="en-GB" sz="4000" dirty="0">
+              <a:rPr lang="en-GB" sz="3600" dirty="0">
                 <a:solidFill>
                   <a:schemeClr val="bg1"/>
                 </a:solidFill>
@@ -3539,7 +3539,7 @@
         </p:nvSpPr>
         <p:spPr>
           <a:xfrm>
-            <a:off x="323528" y="188640"/>
+            <a:off x="395536" y="764704"/>
             <a:ext cx="8640960" cy="6480720"/>
           </a:xfrm>
         </p:spPr>
@@ -3550,7 +3550,7 @@
           <a:lstStyle/>
           <a:p>
             <a:r>
-              <a:rPr lang="en-GB" sz="4000" dirty="0">
+              <a:rPr lang="en-GB" sz="3600" dirty="0">
                 <a:solidFill>
                   <a:schemeClr val="bg1"/>
                 </a:solidFill>
@@ -3560,7 +3560,7 @@
           </a:p>
           <a:p>
             <a:r>
-              <a:rPr lang="en-GB" sz="4000" dirty="0">
+              <a:rPr lang="en-GB" sz="3600" dirty="0">
                 <a:solidFill>
                   <a:schemeClr val="bg1"/>
                 </a:solidFill>
@@ -3570,7 +3570,7 @@
           </a:p>
           <a:p>
             <a:r>
-              <a:rPr lang="en-GB" sz="4000" dirty="0">
+              <a:rPr lang="en-GB" sz="3600" dirty="0">
                 <a:solidFill>
                   <a:schemeClr val="bg1"/>
                 </a:solidFill>
@@ -3580,7 +3580,7 @@
           </a:p>
           <a:p>
             <a:r>
-              <a:rPr lang="en-GB" sz="4000" dirty="0">
+              <a:rPr lang="en-GB" sz="3600" dirty="0">
                 <a:solidFill>
                   <a:schemeClr val="bg1"/>
                 </a:solidFill>
@@ -3665,7 +3665,7 @@
         </p:nvSpPr>
         <p:spPr>
           <a:xfrm>
-            <a:off x="323528" y="188640"/>
+            <a:off x="251520" y="692696"/>
             <a:ext cx="8640960" cy="6480720"/>
           </a:xfrm>
         </p:spPr>
@@ -3676,7 +3676,7 @@
           <a:lstStyle/>
           <a:p>
             <a:r>
-              <a:rPr lang="en-GB" sz="4000" dirty="0">
+              <a:rPr lang="en-GB" sz="3600" dirty="0">
                 <a:solidFill>
                   <a:schemeClr val="bg1"/>
                 </a:solidFill>
@@ -3686,7 +3686,7 @@
           </a:p>
           <a:p>
             <a:r>
-              <a:rPr lang="en-GB" sz="4000" dirty="0">
+              <a:rPr lang="en-GB" sz="3600" dirty="0">
                 <a:solidFill>
                   <a:schemeClr val="bg1"/>
                 </a:solidFill>
@@ -3771,7 +3771,7 @@
         </p:nvSpPr>
         <p:spPr>
           <a:xfrm>
-            <a:off x="323528" y="188640"/>
+            <a:off x="251520" y="836712"/>
             <a:ext cx="8640960" cy="6480720"/>
           </a:xfrm>
         </p:spPr>
@@ -3782,7 +3782,7 @@
           <a:lstStyle/>
           <a:p>
             <a:r>
-              <a:rPr lang="en-GB" sz="4000" dirty="0">
+              <a:rPr lang="en-GB" sz="3600" dirty="0">
                 <a:solidFill>
                   <a:schemeClr val="bg1"/>
                 </a:solidFill>
@@ -3792,7 +3792,7 @@
           </a:p>
           <a:p>
             <a:r>
-              <a:rPr lang="en-GB" sz="4000" dirty="0">
+              <a:rPr lang="en-GB" sz="3600" dirty="0">
                 <a:solidFill>
                   <a:schemeClr val="bg1"/>
                 </a:solidFill>
@@ -3802,7 +3802,7 @@
           </a:p>
           <a:p>
             <a:r>
-              <a:rPr lang="en-GB" sz="4000" dirty="0">
+              <a:rPr lang="en-GB" sz="3600" dirty="0">
                 <a:solidFill>
                   <a:schemeClr val="bg1"/>
                 </a:solidFill>

</xml_diff>